<commit_message>
Day 30 content updated
</commit_message>
<xml_diff>
--- a/Day29/DockerAndKubernetes_Training-Day29.pptx
+++ b/Day29/DockerAndKubernetes_Training-Day29.pptx
@@ -199,7 +199,7 @@
           <a:p>
             <a:fld id="{B09F413D-6E72-4B8A-80ED-A580F7C91B71}" type="datetimeFigureOut">
               <a:rPr lang="en-IN" smtClean="0"/>
-              <a:t>13-05-2023</a:t>
+              <a:t>14-05-2023</a:t>
             </a:fld>
             <a:endParaRPr lang="en-IN"/>
           </a:p>
@@ -802,7 +802,7 @@
           <a:p>
             <a:fld id="{12E8600E-B0EE-4521-BF40-4B72FBA06775}" type="datetimeFigureOut">
               <a:rPr lang="en-IN" smtClean="0"/>
-              <a:t>13-05-2023</a:t>
+              <a:t>14-05-2023</a:t>
             </a:fld>
             <a:endParaRPr lang="en-IN"/>
           </a:p>
@@ -1891,7 +1891,7 @@
             <a:fld id="{49F3E739-D457-46E5-B626-C9B182A007EE}" type="datetimeFigureOut">
               <a:rPr lang="en-US" smtClean="0"/>
               <a:pPr/>
-              <a:t>5/13/2023</a:t>
+              <a:t>5/14/2023</a:t>
             </a:fld>
             <a:endParaRPr lang="en-US"/>
           </a:p>
@@ -2873,7 +2873,7 @@
             <a:fld id="{49F3E739-D457-46E5-B626-C9B182A007EE}" type="datetimeFigureOut">
               <a:rPr lang="en-US" smtClean="0"/>
               <a:pPr/>
-              <a:t>5/13/2023</a:t>
+              <a:t>5/14/2023</a:t>
             </a:fld>
             <a:endParaRPr lang="en-US"/>
           </a:p>
@@ -4009,7 +4009,7 @@
             <a:fld id="{49F3E739-D457-46E5-B626-C9B182A007EE}" type="datetimeFigureOut">
               <a:rPr lang="en-US" smtClean="0"/>
               <a:pPr/>
-              <a:t>5/13/2023</a:t>
+              <a:t>5/14/2023</a:t>
             </a:fld>
             <a:endParaRPr lang="en-US"/>
           </a:p>
@@ -5044,7 +5044,7 @@
             <a:fld id="{49F3E739-D457-46E5-B626-C9B182A007EE}" type="datetimeFigureOut">
               <a:rPr lang="en-US" smtClean="0"/>
               <a:pPr/>
-              <a:t>5/13/2023</a:t>
+              <a:t>5/14/2023</a:t>
             </a:fld>
             <a:endParaRPr lang="en-US"/>
           </a:p>
@@ -5706,7 +5706,7 @@
             <a:fld id="{49F3E739-D457-46E5-B626-C9B182A007EE}" type="datetimeFigureOut">
               <a:rPr lang="en-US" smtClean="0"/>
               <a:pPr/>
-              <a:t>5/13/2023</a:t>
+              <a:t>5/14/2023</a:t>
             </a:fld>
             <a:endParaRPr lang="en-US"/>
           </a:p>
@@ -6569,7 +6569,7 @@
             <a:fld id="{49F3E739-D457-46E5-B626-C9B182A007EE}" type="datetimeFigureOut">
               <a:rPr lang="en-US" smtClean="0"/>
               <a:pPr/>
-              <a:t>5/13/2023</a:t>
+              <a:t>5/14/2023</a:t>
             </a:fld>
             <a:endParaRPr lang="en-US"/>
           </a:p>
@@ -6760,7 +6760,7 @@
           <a:p>
             <a:fld id="{12E8600E-B0EE-4521-BF40-4B72FBA06775}" type="datetimeFigureOut">
               <a:rPr lang="en-IN" smtClean="0"/>
-              <a:t>13-05-2023</a:t>
+              <a:t>14-05-2023</a:t>
             </a:fld>
             <a:endParaRPr lang="en-IN"/>
           </a:p>
@@ -7732,7 +7732,7 @@
           <a:p>
             <a:fld id="{12E8600E-B0EE-4521-BF40-4B72FBA06775}" type="datetimeFigureOut">
               <a:rPr lang="en-IN" smtClean="0"/>
-              <a:t>13-05-2023</a:t>
+              <a:t>14-05-2023</a:t>
             </a:fld>
             <a:endParaRPr lang="en-IN"/>
           </a:p>
@@ -7943,7 +7943,7 @@
           <a:p>
             <a:fld id="{12E8600E-B0EE-4521-BF40-4B72FBA06775}" type="datetimeFigureOut">
               <a:rPr lang="en-IN" smtClean="0"/>
-              <a:t>13-05-2023</a:t>
+              <a:t>14-05-2023</a:t>
             </a:fld>
             <a:endParaRPr lang="en-IN"/>
           </a:p>
@@ -8977,7 +8977,7 @@
           <a:p>
             <a:fld id="{12E8600E-B0EE-4521-BF40-4B72FBA06775}" type="datetimeFigureOut">
               <a:rPr lang="en-IN" smtClean="0"/>
-              <a:t>13-05-2023</a:t>
+              <a:t>14-05-2023</a:t>
             </a:fld>
             <a:endParaRPr lang="en-IN"/>
           </a:p>
@@ -9249,7 +9249,7 @@
           <a:p>
             <a:fld id="{12E8600E-B0EE-4521-BF40-4B72FBA06775}" type="datetimeFigureOut">
               <a:rPr lang="en-IN" smtClean="0"/>
-              <a:t>13-05-2023</a:t>
+              <a:t>14-05-2023</a:t>
             </a:fld>
             <a:endParaRPr lang="en-IN"/>
           </a:p>
@@ -9660,7 +9660,7 @@
             <a:fld id="{49F3E739-D457-46E5-B626-C9B182A007EE}" type="datetimeFigureOut">
               <a:rPr lang="en-US" smtClean="0"/>
               <a:pPr/>
-              <a:t>5/13/2023</a:t>
+              <a:t>5/14/2023</a:t>
             </a:fld>
             <a:endParaRPr lang="en-US"/>
           </a:p>
@@ -9788,7 +9788,7 @@
           <a:p>
             <a:fld id="{12E8600E-B0EE-4521-BF40-4B72FBA06775}" type="datetimeFigureOut">
               <a:rPr lang="en-IN" smtClean="0"/>
-              <a:t>13-05-2023</a:t>
+              <a:t>14-05-2023</a:t>
             </a:fld>
             <a:endParaRPr lang="en-IN"/>
           </a:p>
@@ -9883,7 +9883,7 @@
           <a:p>
             <a:fld id="{12E8600E-B0EE-4521-BF40-4B72FBA06775}" type="datetimeFigureOut">
               <a:rPr lang="en-IN" smtClean="0"/>
-              <a:t>13-05-2023</a:t>
+              <a:t>14-05-2023</a:t>
             </a:fld>
             <a:endParaRPr lang="en-IN"/>
           </a:p>
@@ -10964,7 +10964,7 @@
           <a:p>
             <a:fld id="{12E8600E-B0EE-4521-BF40-4B72FBA06775}" type="datetimeFigureOut">
               <a:rPr lang="en-IN" smtClean="0"/>
-              <a:t>13-05-2023</a:t>
+              <a:t>14-05-2023</a:t>
             </a:fld>
             <a:endParaRPr lang="en-IN"/>
           </a:p>
@@ -12073,7 +12073,7 @@
             <a:fld id="{49F3E739-D457-46E5-B626-C9B182A007EE}" type="datetimeFigureOut">
               <a:rPr lang="en-US" smtClean="0"/>
               <a:pPr/>
-              <a:t>5/13/2023</a:t>
+              <a:t>5/14/2023</a:t>
             </a:fld>
             <a:endParaRPr lang="en-US"/>
           </a:p>
@@ -13072,7 +13072,7 @@
             <a:fld id="{49F3E739-D457-46E5-B626-C9B182A007EE}" type="datetimeFigureOut">
               <a:rPr lang="en-US" smtClean="0"/>
               <a:pPr/>
-              <a:t>5/13/2023</a:t>
+              <a:t>5/14/2023</a:t>
             </a:fld>
             <a:endParaRPr lang="en-US"/>
           </a:p>
@@ -14071,22 +14071,6 @@
             </a:r>
           </a:p>
           <a:p>
-            <a:r>
-              <a:rPr lang="en-US" dirty="0" err="1"/>
-              <a:t>Daemonset</a:t>
-            </a:r>
-            <a:r>
-              <a:rPr lang="en-US" dirty="0"/>
-              <a:t> understanding, use-cases and Demo</a:t>
-            </a:r>
-          </a:p>
-          <a:p>
-            <a:pPr marL="1371600" lvl="3" indent="0">
-              <a:buNone/>
-            </a:pPr>
-            <a:endParaRPr lang="en-US" dirty="0"/>
-          </a:p>
-          <a:p>
             <a:pPr marL="0" indent="0">
               <a:buNone/>
             </a:pPr>
@@ -14203,52 +14187,59 @@
           <a:p>
             <a:r>
               <a:rPr lang="en-US" dirty="0"/>
-              <a:t>Pod vs Replication Controller vs Replica Set</a:t>
+              <a:t>Refer daily notes section for all the reference links</a:t>
             </a:r>
           </a:p>
           <a:p>
-            <a:pPr lvl="1">
-              <a:buFont typeface="Wingdings" panose="05000000000000000000" pitchFamily="2" charset="2"/>
-              <a:buChar char="Ø"/>
-            </a:pPr>
+            <a:pPr lvl="1"/>
             <a:r>
               <a:rPr lang="en-US" dirty="0"/>
-              <a:t>https://sysdig.com/learn-cloud-native/kubernetes-101/kubernetes-replicasets-overview/</a:t>
+              <a:t>Pod, Replication controller and Replica Set</a:t>
             </a:r>
           </a:p>
           <a:p>
-            <a:pPr lvl="1">
-              <a:buFont typeface="Wingdings" panose="05000000000000000000" pitchFamily="2" charset="2"/>
-              <a:buChar char="Ø"/>
-            </a:pPr>
+            <a:pPr lvl="1"/>
             <a:r>
               <a:rPr lang="en-US" dirty="0"/>
-              <a:t>https://www.mirantis.com/blog/kubernetes-replication-controller-replica-set-and-deployments-understanding-replication-options/</a:t>
+              <a:t>Deployment</a:t>
             </a:r>
           </a:p>
           <a:p>
+            <a:pPr lvl="1"/>
             <a:r>
               <a:rPr lang="en-US" dirty="0"/>
-              <a:t>Static Pods and </a:t>
+              <a:t>Deployment strategies</a:t>
+            </a:r>
+          </a:p>
+          <a:p>
+            <a:pPr lvl="1"/>
+            <a:r>
+              <a:rPr lang="en-US" dirty="0"/>
+              <a:t>Rollout/Rollback </a:t>
+            </a:r>
+          </a:p>
+          <a:p>
+            <a:pPr lvl="1"/>
+            <a:r>
+              <a:rPr lang="en-US" dirty="0"/>
+              <a:t>Types of controllers</a:t>
+            </a:r>
+          </a:p>
+          <a:p>
+            <a:pPr lvl="1"/>
+            <a:r>
+              <a:rPr lang="en-US" dirty="0"/>
+              <a:t>K8S cheat sheet </a:t>
             </a:r>
             <a:r>
-              <a:rPr lang="en-US" dirty="0" err="1"/>
-              <a:t>Daemonset</a:t>
+              <a:rPr lang="en-US"/>
+              <a:t>and details</a:t>
             </a:r>
-            <a:r>
-              <a:rPr lang="en-US" dirty="0"/>
-              <a:t>:</a:t>
-            </a:r>
-          </a:p>
-          <a:p>
-            <a:pPr lvl="1">
-              <a:buFont typeface="Wingdings" panose="05000000000000000000" pitchFamily="2" charset="2"/>
-              <a:buChar char="Ø"/>
-            </a:pPr>
-            <a:r>
-              <a:rPr lang="en-US" dirty="0"/>
-              <a:t>https://medium.com/google-cloud/daemon-sets-static-pods-bf43b10efe97</a:t>
-            </a:r>
+            <a:endParaRPr lang="en-US" dirty="0"/>
+          </a:p>
+          <a:p>
+            <a:pPr lvl="1"/>
+            <a:endParaRPr lang="en-US" dirty="0"/>
           </a:p>
         </p:txBody>
       </p:sp>

</xml_diff>